<commit_message>
Fix the grammer issues
</commit_message>
<xml_diff>
--- a/Java Virtual Threads/Java Virtual Threads.pptx
+++ b/Java Virtual Threads/Java Virtual Threads.pptx
@@ -279,7 +279,7 @@
           <a:p>
             <a:fld id="{870ADB1F-8543-4565-B030-EDD4F5377F6C}" type="datetimeFigureOut">
               <a:rPr lang="en-US" smtClean="0"/>
-              <a:t>5/3/2024</a:t>
+              <a:t>5/15/2024</a:t>
             </a:fld>
             <a:endParaRPr lang="en-US"/>
           </a:p>
@@ -479,7 +479,7 @@
           <a:p>
             <a:fld id="{870ADB1F-8543-4565-B030-EDD4F5377F6C}" type="datetimeFigureOut">
               <a:rPr lang="en-US" smtClean="0"/>
-              <a:t>5/3/2024</a:t>
+              <a:t>5/15/2024</a:t>
             </a:fld>
             <a:endParaRPr lang="en-US"/>
           </a:p>
@@ -689,7 +689,7 @@
           <a:p>
             <a:fld id="{870ADB1F-8543-4565-B030-EDD4F5377F6C}" type="datetimeFigureOut">
               <a:rPr lang="en-US" smtClean="0"/>
-              <a:t>5/3/2024</a:t>
+              <a:t>5/15/2024</a:t>
             </a:fld>
             <a:endParaRPr lang="en-US"/>
           </a:p>
@@ -889,7 +889,7 @@
           <a:p>
             <a:fld id="{870ADB1F-8543-4565-B030-EDD4F5377F6C}" type="datetimeFigureOut">
               <a:rPr lang="en-US" smtClean="0"/>
-              <a:t>5/3/2024</a:t>
+              <a:t>5/15/2024</a:t>
             </a:fld>
             <a:endParaRPr lang="en-US"/>
           </a:p>
@@ -1165,7 +1165,7 @@
           <a:p>
             <a:fld id="{870ADB1F-8543-4565-B030-EDD4F5377F6C}" type="datetimeFigureOut">
               <a:rPr lang="en-US" smtClean="0"/>
-              <a:t>5/3/2024</a:t>
+              <a:t>5/15/2024</a:t>
             </a:fld>
             <a:endParaRPr lang="en-US"/>
           </a:p>
@@ -1433,7 +1433,7 @@
           <a:p>
             <a:fld id="{870ADB1F-8543-4565-B030-EDD4F5377F6C}" type="datetimeFigureOut">
               <a:rPr lang="en-US" smtClean="0"/>
-              <a:t>5/3/2024</a:t>
+              <a:t>5/15/2024</a:t>
             </a:fld>
             <a:endParaRPr lang="en-US"/>
           </a:p>
@@ -1848,7 +1848,7 @@
           <a:p>
             <a:fld id="{870ADB1F-8543-4565-B030-EDD4F5377F6C}" type="datetimeFigureOut">
               <a:rPr lang="en-US" smtClean="0"/>
-              <a:t>5/3/2024</a:t>
+              <a:t>5/15/2024</a:t>
             </a:fld>
             <a:endParaRPr lang="en-US"/>
           </a:p>
@@ -1990,7 +1990,7 @@
           <a:p>
             <a:fld id="{870ADB1F-8543-4565-B030-EDD4F5377F6C}" type="datetimeFigureOut">
               <a:rPr lang="en-US" smtClean="0"/>
-              <a:t>5/3/2024</a:t>
+              <a:t>5/15/2024</a:t>
             </a:fld>
             <a:endParaRPr lang="en-US"/>
           </a:p>
@@ -2103,7 +2103,7 @@
           <a:p>
             <a:fld id="{870ADB1F-8543-4565-B030-EDD4F5377F6C}" type="datetimeFigureOut">
               <a:rPr lang="en-US" smtClean="0"/>
-              <a:t>5/3/2024</a:t>
+              <a:t>5/15/2024</a:t>
             </a:fld>
             <a:endParaRPr lang="en-US"/>
           </a:p>
@@ -2416,7 +2416,7 @@
           <a:p>
             <a:fld id="{870ADB1F-8543-4565-B030-EDD4F5377F6C}" type="datetimeFigureOut">
               <a:rPr lang="en-US" smtClean="0"/>
-              <a:t>5/3/2024</a:t>
+              <a:t>5/15/2024</a:t>
             </a:fld>
             <a:endParaRPr lang="en-US"/>
           </a:p>
@@ -2705,7 +2705,7 @@
           <a:p>
             <a:fld id="{870ADB1F-8543-4565-B030-EDD4F5377F6C}" type="datetimeFigureOut">
               <a:rPr lang="en-US" smtClean="0"/>
-              <a:t>5/3/2024</a:t>
+              <a:t>5/15/2024</a:t>
             </a:fld>
             <a:endParaRPr lang="en-US"/>
           </a:p>
@@ -2948,7 +2948,7 @@
           <a:p>
             <a:fld id="{870ADB1F-8543-4565-B030-EDD4F5377F6C}" type="datetimeFigureOut">
               <a:rPr lang="en-US" smtClean="0"/>
-              <a:t>5/3/2024</a:t>
+              <a:t>5/15/2024</a:t>
             </a:fld>
             <a:endParaRPr lang="en-US"/>
           </a:p>
@@ -4795,7 +4795,7 @@
           <a:p>
             <a:r>
               <a:rPr lang="en-US" dirty="0"/>
-              <a:t>Before get started:</a:t>
+              <a:t>Before we get started:</a:t>
             </a:r>
           </a:p>
         </p:txBody>
@@ -5370,7 +5370,7 @@
             <a:pPr algn="ctr"/>
             <a:r>
               <a:rPr lang="en-US" dirty="0"/>
-              <a:t>How does process seen in the memory?</a:t>
+              <a:t>How is process seen in the memory?</a:t>
             </a:r>
           </a:p>
         </p:txBody>

</xml_diff>